<commit_message>
presentation and explanatory note fixed
</commit_message>
<xml_diff>
--- a/Презентация.pptx
+++ b/Презентация.pptx
@@ -304,7 +304,7 @@
           <a:p>
             <a:fld id="{81883F91-099E-4FB7-B1CE-68CF5F644D92}" type="datetimeFigureOut">
               <a:rPr lang="ru-RU" smtClean="0"/>
-              <a:t>09.01.2022</a:t>
+              <a:t>16.01.2022</a:t>
             </a:fld>
             <a:endParaRPr lang="ru-RU"/>
           </a:p>
@@ -602,7 +602,7 @@
           <a:p>
             <a:fld id="{81883F91-099E-4FB7-B1CE-68CF5F644D92}" type="datetimeFigureOut">
               <a:rPr lang="ru-RU" smtClean="0"/>
-              <a:t>09.01.2022</a:t>
+              <a:t>16.01.2022</a:t>
             </a:fld>
             <a:endParaRPr lang="ru-RU"/>
           </a:p>
@@ -794,7 +794,7 @@
           <a:p>
             <a:fld id="{81883F91-099E-4FB7-B1CE-68CF5F644D92}" type="datetimeFigureOut">
               <a:rPr lang="ru-RU" smtClean="0"/>
-              <a:t>09.01.2022</a:t>
+              <a:t>16.01.2022</a:t>
             </a:fld>
             <a:endParaRPr lang="ru-RU"/>
           </a:p>
@@ -1055,7 +1055,7 @@
           <a:p>
             <a:fld id="{81883F91-099E-4FB7-B1CE-68CF5F644D92}" type="datetimeFigureOut">
               <a:rPr lang="ru-RU" smtClean="0"/>
-              <a:t>09.01.2022</a:t>
+              <a:t>16.01.2022</a:t>
             </a:fld>
             <a:endParaRPr lang="ru-RU"/>
           </a:p>
@@ -1479,7 +1479,7 @@
           <a:p>
             <a:fld id="{81883F91-099E-4FB7-B1CE-68CF5F644D92}" type="datetimeFigureOut">
               <a:rPr lang="ru-RU" smtClean="0"/>
-              <a:t>09.01.2022</a:t>
+              <a:t>16.01.2022</a:t>
             </a:fld>
             <a:endParaRPr lang="ru-RU"/>
           </a:p>
@@ -2016,7 +2016,7 @@
           <a:p>
             <a:fld id="{81883F91-099E-4FB7-B1CE-68CF5F644D92}" type="datetimeFigureOut">
               <a:rPr lang="ru-RU" smtClean="0"/>
-              <a:t>09.01.2022</a:t>
+              <a:t>16.01.2022</a:t>
             </a:fld>
             <a:endParaRPr lang="ru-RU"/>
           </a:p>
@@ -2880,7 +2880,7 @@
           <a:p>
             <a:fld id="{81883F91-099E-4FB7-B1CE-68CF5F644D92}" type="datetimeFigureOut">
               <a:rPr lang="ru-RU" smtClean="0"/>
-              <a:t>09.01.2022</a:t>
+              <a:t>16.01.2022</a:t>
             </a:fld>
             <a:endParaRPr lang="ru-RU"/>
           </a:p>
@@ -3050,7 +3050,7 @@
           <a:p>
             <a:fld id="{81883F91-099E-4FB7-B1CE-68CF5F644D92}" type="datetimeFigureOut">
               <a:rPr lang="ru-RU" smtClean="0"/>
-              <a:t>09.01.2022</a:t>
+              <a:t>16.01.2022</a:t>
             </a:fld>
             <a:endParaRPr lang="ru-RU"/>
           </a:p>
@@ -3234,7 +3234,7 @@
           <a:p>
             <a:fld id="{81883F91-099E-4FB7-B1CE-68CF5F644D92}" type="datetimeFigureOut">
               <a:rPr lang="ru-RU" smtClean="0"/>
-              <a:t>09.01.2022</a:t>
+              <a:t>16.01.2022</a:t>
             </a:fld>
             <a:endParaRPr lang="ru-RU"/>
           </a:p>
@@ -3404,7 +3404,7 @@
           <a:p>
             <a:fld id="{81883F91-099E-4FB7-B1CE-68CF5F644D92}" type="datetimeFigureOut">
               <a:rPr lang="ru-RU" smtClean="0"/>
-              <a:t>09.01.2022</a:t>
+              <a:t>16.01.2022</a:t>
             </a:fld>
             <a:endParaRPr lang="ru-RU"/>
           </a:p>
@@ -3648,7 +3648,7 @@
           <a:p>
             <a:fld id="{81883F91-099E-4FB7-B1CE-68CF5F644D92}" type="datetimeFigureOut">
               <a:rPr lang="ru-RU" smtClean="0"/>
-              <a:t>09.01.2022</a:t>
+              <a:t>16.01.2022</a:t>
             </a:fld>
             <a:endParaRPr lang="ru-RU"/>
           </a:p>
@@ -3884,7 +3884,7 @@
           <a:p>
             <a:fld id="{81883F91-099E-4FB7-B1CE-68CF5F644D92}" type="datetimeFigureOut">
               <a:rPr lang="ru-RU" smtClean="0"/>
-              <a:t>09.01.2022</a:t>
+              <a:t>16.01.2022</a:t>
             </a:fld>
             <a:endParaRPr lang="ru-RU"/>
           </a:p>
@@ -4350,7 +4350,7 @@
           <a:p>
             <a:fld id="{81883F91-099E-4FB7-B1CE-68CF5F644D92}" type="datetimeFigureOut">
               <a:rPr lang="ru-RU" smtClean="0"/>
-              <a:t>09.01.2022</a:t>
+              <a:t>16.01.2022</a:t>
             </a:fld>
             <a:endParaRPr lang="ru-RU"/>
           </a:p>
@@ -4468,7 +4468,7 @@
           <a:p>
             <a:fld id="{81883F91-099E-4FB7-B1CE-68CF5F644D92}" type="datetimeFigureOut">
               <a:rPr lang="ru-RU" smtClean="0"/>
-              <a:t>09.01.2022</a:t>
+              <a:t>16.01.2022</a:t>
             </a:fld>
             <a:endParaRPr lang="ru-RU"/>
           </a:p>
@@ -4563,7 +4563,7 @@
           <a:p>
             <a:fld id="{81883F91-099E-4FB7-B1CE-68CF5F644D92}" type="datetimeFigureOut">
               <a:rPr lang="ru-RU" smtClean="0"/>
-              <a:t>09.01.2022</a:t>
+              <a:t>16.01.2022</a:t>
             </a:fld>
             <a:endParaRPr lang="ru-RU"/>
           </a:p>
@@ -4818,7 +4818,7 @@
           <a:p>
             <a:fld id="{81883F91-099E-4FB7-B1CE-68CF5F644D92}" type="datetimeFigureOut">
               <a:rPr lang="ru-RU" smtClean="0"/>
-              <a:t>09.01.2022</a:t>
+              <a:t>16.01.2022</a:t>
             </a:fld>
             <a:endParaRPr lang="ru-RU"/>
           </a:p>
@@ -5118,7 +5118,7 @@
           <a:p>
             <a:fld id="{81883F91-099E-4FB7-B1CE-68CF5F644D92}" type="datetimeFigureOut">
               <a:rPr lang="ru-RU" smtClean="0"/>
-              <a:t>09.01.2022</a:t>
+              <a:t>16.01.2022</a:t>
             </a:fld>
             <a:endParaRPr lang="ru-RU"/>
           </a:p>
@@ -5352,7 +5352,7 @@
           <a:p>
             <a:fld id="{81883F91-099E-4FB7-B1CE-68CF5F644D92}" type="datetimeFigureOut">
               <a:rPr lang="ru-RU" smtClean="0"/>
-              <a:t>09.01.2022</a:t>
+              <a:t>16.01.2022</a:t>
             </a:fld>
             <a:endParaRPr lang="ru-RU"/>
           </a:p>
@@ -6613,10 +6613,10 @@
       </p:sp>
       <p:pic>
         <p:nvPicPr>
-          <p:cNvPr id="7" name="Объект 6">
+          <p:cNvPr id="6" name="Объект 5">
             <a:extLst>
               <a:ext uri="{FF2B5EF4-FFF2-40B4-BE49-F238E27FC236}">
-                <a16:creationId xmlns:a16="http://schemas.microsoft.com/office/drawing/2014/main" id="{066BCAAB-C7A1-4501-8D31-D4EF50A8A52D}"/>
+                <a16:creationId xmlns:a16="http://schemas.microsoft.com/office/drawing/2014/main" id="{2FA39FA3-1735-4181-8E18-C4D4850E57F1}"/>
               </a:ext>
             </a:extLst>
           </p:cNvPr>
@@ -6641,8 +6641,8 @@
         </p:blipFill>
         <p:spPr>
           <a:xfrm>
-            <a:off x="4344159" y="1700432"/>
-            <a:ext cx="3493034" cy="4059237"/>
+            <a:off x="3926200" y="1523253"/>
+            <a:ext cx="4339600" cy="5151246"/>
           </a:xfrm>
         </p:spPr>
       </p:pic>
@@ -6706,10 +6706,10 @@
       </p:sp>
       <p:pic>
         <p:nvPicPr>
-          <p:cNvPr id="5" name="Объект 4">
+          <p:cNvPr id="8" name="Объект 7">
             <a:extLst>
               <a:ext uri="{FF2B5EF4-FFF2-40B4-BE49-F238E27FC236}">
-                <a16:creationId xmlns:a16="http://schemas.microsoft.com/office/drawing/2014/main" id="{29275CE5-88C6-4F43-B752-8D080718ACEC}"/>
+                <a16:creationId xmlns:a16="http://schemas.microsoft.com/office/drawing/2014/main" id="{64E7C3A4-D825-4DA4-B69B-BE25AD75F129}"/>
               </a:ext>
             </a:extLst>
           </p:cNvPr>
@@ -6734,17 +6734,17 @@
         </p:blipFill>
         <p:spPr>
           <a:xfrm>
-            <a:off x="7813439" y="1731963"/>
-            <a:ext cx="3464768" cy="4330961"/>
+            <a:off x="7232491" y="1517845"/>
+            <a:ext cx="3809341" cy="4901797"/>
           </a:xfrm>
         </p:spPr>
       </p:pic>
       <p:pic>
         <p:nvPicPr>
-          <p:cNvPr id="7" name="Рисунок 6">
+          <p:cNvPr id="10" name="Рисунок 9">
             <a:extLst>
               <a:ext uri="{FF2B5EF4-FFF2-40B4-BE49-F238E27FC236}">
-                <a16:creationId xmlns:a16="http://schemas.microsoft.com/office/drawing/2014/main" id="{6A6BE539-A6E3-4472-98E5-52E56F4218BD}"/>
+                <a16:creationId xmlns:a16="http://schemas.microsoft.com/office/drawing/2014/main" id="{9B5AF74E-83C1-4BA7-8208-A6AF5F9DD94D}"/>
               </a:ext>
             </a:extLst>
           </p:cNvPr>
@@ -6767,8 +6767,8 @@
         </p:blipFill>
         <p:spPr>
           <a:xfrm>
-            <a:off x="913795" y="1731963"/>
-            <a:ext cx="3464768" cy="4330959"/>
+            <a:off x="1150170" y="1580050"/>
+            <a:ext cx="3809341" cy="4901796"/>
           </a:xfrm>
           <a:prstGeom prst="rect">
             <a:avLst/>
@@ -6903,6 +6903,42 @@
           </a:p>
         </p:txBody>
       </p:sp>
+      <p:pic>
+        <p:nvPicPr>
+          <p:cNvPr id="4" name="Рисунок 3">
+            <a:extLst>
+              <a:ext uri="{FF2B5EF4-FFF2-40B4-BE49-F238E27FC236}">
+                <a16:creationId xmlns:a16="http://schemas.microsoft.com/office/drawing/2014/main" id="{F2C63FA9-96F4-4BF1-9276-6131CDBDCF71}"/>
+              </a:ext>
+            </a:extLst>
+          </p:cNvPr>
+          <p:cNvPicPr>
+            <a:picLocks noChangeAspect="1"/>
+          </p:cNvPicPr>
+          <p:nvPr/>
+        </p:nvPicPr>
+        <p:blipFill>
+          <a:blip r:embed="rId3">
+            <a:extLst>
+              <a:ext uri="{28A0092B-C50C-407E-A947-70E740481C1C}">
+                <a14:useLocalDpi xmlns:a14="http://schemas.microsoft.com/office/drawing/2010/main" val="0"/>
+              </a:ext>
+            </a:extLst>
+          </a:blip>
+          <a:stretch>
+            <a:fillRect/>
+          </a:stretch>
+        </p:blipFill>
+        <p:spPr>
+          <a:xfrm>
+            <a:off x="1441074" y="1787949"/>
+            <a:ext cx="3154561" cy="4059235"/>
+          </a:xfrm>
+          <a:prstGeom prst="rect">
+            <a:avLst/>
+          </a:prstGeom>
+        </p:spPr>
+      </p:pic>
     </p:spTree>
     <p:extLst>
       <p:ext uri="{BB962C8B-B14F-4D97-AF65-F5344CB8AC3E}">

</xml_diff>